<commit_message>
1) updating PLAN.md to reflect most recent knowledge. 2) adding an updated slide to example.pptx that reflects the treeval tb. 3) updating treeval to support both max and min computations at any given parent which is vital for 2 player games.
</commit_message>
<xml_diff>
--- a/example.pptx
+++ b/example.pptx
@@ -6,6 +6,7 @@
   </p:sldMasterIdLst>
   <p:sldIdLst>
     <p:sldId id="257" r:id="rId2"/>
+    <p:sldId id="258" r:id="rId3"/>
   </p:sldIdLst>
   <p:sldSz cx="12192000" cy="6858000"/>
   <p:notesSz cx="6858000" cy="9144000"/>
@@ -259,7 +260,7 @@
           <a:p>
             <a:fld id="{C5AAA47F-A216-4C74-9267-F518211BD4EC}" type="datetimeFigureOut">
               <a:rPr lang="en-US" smtClean="0"/>
-              <a:t>5/6/2021</a:t>
+              <a:t>6/1/2021</a:t>
             </a:fld>
             <a:endParaRPr lang="en-US"/>
           </a:p>
@@ -457,7 +458,7 @@
           <a:p>
             <a:fld id="{C5AAA47F-A216-4C74-9267-F518211BD4EC}" type="datetimeFigureOut">
               <a:rPr lang="en-US" smtClean="0"/>
-              <a:t>5/6/2021</a:t>
+              <a:t>6/1/2021</a:t>
             </a:fld>
             <a:endParaRPr lang="en-US"/>
           </a:p>
@@ -665,7 +666,7 @@
           <a:p>
             <a:fld id="{C5AAA47F-A216-4C74-9267-F518211BD4EC}" type="datetimeFigureOut">
               <a:rPr lang="en-US" smtClean="0"/>
-              <a:t>5/6/2021</a:t>
+              <a:t>6/1/2021</a:t>
             </a:fld>
             <a:endParaRPr lang="en-US"/>
           </a:p>
@@ -863,7 +864,7 @@
           <a:p>
             <a:fld id="{C5AAA47F-A216-4C74-9267-F518211BD4EC}" type="datetimeFigureOut">
               <a:rPr lang="en-US" smtClean="0"/>
-              <a:t>5/6/2021</a:t>
+              <a:t>6/1/2021</a:t>
             </a:fld>
             <a:endParaRPr lang="en-US"/>
           </a:p>
@@ -1138,7 +1139,7 @@
           <a:p>
             <a:fld id="{C5AAA47F-A216-4C74-9267-F518211BD4EC}" type="datetimeFigureOut">
               <a:rPr lang="en-US" smtClean="0"/>
-              <a:t>5/6/2021</a:t>
+              <a:t>6/1/2021</a:t>
             </a:fld>
             <a:endParaRPr lang="en-US"/>
           </a:p>
@@ -1403,7 +1404,7 @@
           <a:p>
             <a:fld id="{C5AAA47F-A216-4C74-9267-F518211BD4EC}" type="datetimeFigureOut">
               <a:rPr lang="en-US" smtClean="0"/>
-              <a:t>5/6/2021</a:t>
+              <a:t>6/1/2021</a:t>
             </a:fld>
             <a:endParaRPr lang="en-US"/>
           </a:p>
@@ -1815,7 +1816,7 @@
           <a:p>
             <a:fld id="{C5AAA47F-A216-4C74-9267-F518211BD4EC}" type="datetimeFigureOut">
               <a:rPr lang="en-US" smtClean="0"/>
-              <a:t>5/6/2021</a:t>
+              <a:t>6/1/2021</a:t>
             </a:fld>
             <a:endParaRPr lang="en-US"/>
           </a:p>
@@ -1956,7 +1957,7 @@
           <a:p>
             <a:fld id="{C5AAA47F-A216-4C74-9267-F518211BD4EC}" type="datetimeFigureOut">
               <a:rPr lang="en-US" smtClean="0"/>
-              <a:t>5/6/2021</a:t>
+              <a:t>6/1/2021</a:t>
             </a:fld>
             <a:endParaRPr lang="en-US"/>
           </a:p>
@@ -2069,7 +2070,7 @@
           <a:p>
             <a:fld id="{C5AAA47F-A216-4C74-9267-F518211BD4EC}" type="datetimeFigureOut">
               <a:rPr lang="en-US" smtClean="0"/>
-              <a:t>5/6/2021</a:t>
+              <a:t>6/1/2021</a:t>
             </a:fld>
             <a:endParaRPr lang="en-US"/>
           </a:p>
@@ -2380,7 +2381,7 @@
           <a:p>
             <a:fld id="{C5AAA47F-A216-4C74-9267-F518211BD4EC}" type="datetimeFigureOut">
               <a:rPr lang="en-US" smtClean="0"/>
-              <a:t>5/6/2021</a:t>
+              <a:t>6/1/2021</a:t>
             </a:fld>
             <a:endParaRPr lang="en-US"/>
           </a:p>
@@ -2668,7 +2669,7 @@
           <a:p>
             <a:fld id="{C5AAA47F-A216-4C74-9267-F518211BD4EC}" type="datetimeFigureOut">
               <a:rPr lang="en-US" smtClean="0"/>
-              <a:t>5/6/2021</a:t>
+              <a:t>6/1/2021</a:t>
             </a:fld>
             <a:endParaRPr lang="en-US"/>
           </a:p>
@@ -2909,7 +2910,7 @@
           <a:p>
             <a:fld id="{C5AAA47F-A216-4C74-9267-F518211BD4EC}" type="datetimeFigureOut">
               <a:rPr lang="en-US" smtClean="0"/>
-              <a:t>5/6/2021</a:t>
+              <a:t>6/1/2021</a:t>
             </a:fld>
             <a:endParaRPr lang="en-US"/>
           </a:p>
@@ -4563,6 +4564,1235 @@
 </p:sld>
 </file>
 
+<file path=ppt/slides/slide2.xml><?xml version="1.0" encoding="utf-8"?>
+<p:sld xmlns:a="http://schemas.openxmlformats.org/drawingml/2006/main" xmlns:r="http://schemas.openxmlformats.org/officeDocument/2006/relationships" xmlns:p="http://schemas.openxmlformats.org/presentationml/2006/main">
+  <p:cSld>
+    <p:spTree>
+      <p:nvGrpSpPr>
+        <p:cNvPr id="1" name=""/>
+        <p:cNvGrpSpPr/>
+        <p:nvPr/>
+      </p:nvGrpSpPr>
+      <p:grpSpPr>
+        <a:xfrm>
+          <a:off x="0" y="0"/>
+          <a:ext cx="0" cy="0"/>
+          <a:chOff x="0" y="0"/>
+          <a:chExt cx="0" cy="0"/>
+        </a:xfrm>
+      </p:grpSpPr>
+      <p:sp>
+        <p:nvSpPr>
+          <p:cNvPr id="4" name="Oval 3">
+            <a:extLst>
+              <a:ext uri="{FF2B5EF4-FFF2-40B4-BE49-F238E27FC236}">
+                <a16:creationId xmlns:a16="http://schemas.microsoft.com/office/drawing/2014/main" id="{9E0F129E-4DC6-402D-8123-510FAAC37D1C}"/>
+              </a:ext>
+            </a:extLst>
+          </p:cNvPr>
+          <p:cNvSpPr/>
+          <p:nvPr/>
+        </p:nvSpPr>
+        <p:spPr>
+          <a:xfrm>
+            <a:off x="692458" y="1944210"/>
+            <a:ext cx="1233996" cy="1260629"/>
+          </a:xfrm>
+          <a:prstGeom prst="ellipse">
+            <a:avLst/>
+          </a:prstGeom>
+          <a:noFill/>
+        </p:spPr>
+        <p:style>
+          <a:lnRef idx="2">
+            <a:schemeClr val="accent1">
+              <a:shade val="50000"/>
+            </a:schemeClr>
+          </a:lnRef>
+          <a:fillRef idx="1">
+            <a:schemeClr val="accent1"/>
+          </a:fillRef>
+          <a:effectRef idx="0">
+            <a:schemeClr val="accent1"/>
+          </a:effectRef>
+          <a:fontRef idx="minor">
+            <a:schemeClr val="lt1"/>
+          </a:fontRef>
+        </p:style>
+        <p:txBody>
+          <a:bodyPr rtlCol="0" anchor="ctr"/>
+          <a:lstStyle/>
+          <a:p>
+            <a:pPr algn="ctr"/>
+            <a:endParaRPr lang="en-US"/>
+          </a:p>
+        </p:txBody>
+      </p:sp>
+      <p:cxnSp>
+        <p:nvCxnSpPr>
+          <p:cNvPr id="6" name="Straight Arrow Connector 5">
+            <a:extLst>
+              <a:ext uri="{FF2B5EF4-FFF2-40B4-BE49-F238E27FC236}">
+                <a16:creationId xmlns:a16="http://schemas.microsoft.com/office/drawing/2014/main" id="{F30753C8-FC4F-45C5-8477-56B02DEB7D2D}"/>
+              </a:ext>
+            </a:extLst>
+          </p:cNvPr>
+          <p:cNvCxnSpPr>
+            <a:cxnSpLocks/>
+            <a:stCxn id="4" idx="5"/>
+            <a:endCxn id="7" idx="2"/>
+          </p:cNvCxnSpPr>
+          <p:nvPr/>
+        </p:nvCxnSpPr>
+        <p:spPr>
+          <a:xfrm>
+            <a:off x="1745739" y="3020224"/>
+            <a:ext cx="1974005" cy="2254020"/>
+          </a:xfrm>
+          <a:prstGeom prst="straightConnector1">
+            <a:avLst/>
+          </a:prstGeom>
+          <a:ln>
+            <a:tailEnd type="triangle"/>
+          </a:ln>
+        </p:spPr>
+        <p:style>
+          <a:lnRef idx="1">
+            <a:schemeClr val="accent1"/>
+          </a:lnRef>
+          <a:fillRef idx="0">
+            <a:schemeClr val="accent1"/>
+          </a:fillRef>
+          <a:effectRef idx="0">
+            <a:schemeClr val="accent1"/>
+          </a:effectRef>
+          <a:fontRef idx="minor">
+            <a:schemeClr val="tx1"/>
+          </a:fontRef>
+        </p:style>
+      </p:cxnSp>
+      <p:sp>
+        <p:nvSpPr>
+          <p:cNvPr id="7" name="Oval 6">
+            <a:extLst>
+              <a:ext uri="{FF2B5EF4-FFF2-40B4-BE49-F238E27FC236}">
+                <a16:creationId xmlns:a16="http://schemas.microsoft.com/office/drawing/2014/main" id="{75F40870-A5B7-4CDA-B771-8D84C64A33FF}"/>
+              </a:ext>
+            </a:extLst>
+          </p:cNvPr>
+          <p:cNvSpPr/>
+          <p:nvPr/>
+        </p:nvSpPr>
+        <p:spPr>
+          <a:xfrm>
+            <a:off x="3719744" y="4643929"/>
+            <a:ext cx="1233996" cy="1260629"/>
+          </a:xfrm>
+          <a:prstGeom prst="ellipse">
+            <a:avLst/>
+          </a:prstGeom>
+          <a:noFill/>
+        </p:spPr>
+        <p:style>
+          <a:lnRef idx="2">
+            <a:schemeClr val="accent1">
+              <a:shade val="50000"/>
+            </a:schemeClr>
+          </a:lnRef>
+          <a:fillRef idx="1">
+            <a:schemeClr val="accent1"/>
+          </a:fillRef>
+          <a:effectRef idx="0">
+            <a:schemeClr val="accent1"/>
+          </a:effectRef>
+          <a:fontRef idx="minor">
+            <a:schemeClr val="lt1"/>
+          </a:fontRef>
+        </p:style>
+        <p:txBody>
+          <a:bodyPr rtlCol="0" anchor="ctr"/>
+          <a:lstStyle/>
+          <a:p>
+            <a:pPr algn="ctr"/>
+            <a:endParaRPr lang="en-US"/>
+          </a:p>
+        </p:txBody>
+      </p:sp>
+      <p:sp>
+        <p:nvSpPr>
+          <p:cNvPr id="8" name="Oval 7">
+            <a:extLst>
+              <a:ext uri="{FF2B5EF4-FFF2-40B4-BE49-F238E27FC236}">
+                <a16:creationId xmlns:a16="http://schemas.microsoft.com/office/drawing/2014/main" id="{A84B050C-4BEB-4522-9714-FD5DF736DD6D}"/>
+              </a:ext>
+            </a:extLst>
+          </p:cNvPr>
+          <p:cNvSpPr/>
+          <p:nvPr/>
+        </p:nvSpPr>
+        <p:spPr>
+          <a:xfrm>
+            <a:off x="3826276" y="323127"/>
+            <a:ext cx="1233996" cy="1260629"/>
+          </a:xfrm>
+          <a:prstGeom prst="ellipse">
+            <a:avLst/>
+          </a:prstGeom>
+          <a:noFill/>
+        </p:spPr>
+        <p:style>
+          <a:lnRef idx="2">
+            <a:schemeClr val="accent1">
+              <a:shade val="50000"/>
+            </a:schemeClr>
+          </a:lnRef>
+          <a:fillRef idx="1">
+            <a:schemeClr val="accent1"/>
+          </a:fillRef>
+          <a:effectRef idx="0">
+            <a:schemeClr val="accent1"/>
+          </a:effectRef>
+          <a:fontRef idx="minor">
+            <a:schemeClr val="lt1"/>
+          </a:fontRef>
+        </p:style>
+        <p:txBody>
+          <a:bodyPr rtlCol="0" anchor="ctr"/>
+          <a:lstStyle/>
+          <a:p>
+            <a:pPr algn="ctr"/>
+            <a:endParaRPr lang="en-US"/>
+          </a:p>
+        </p:txBody>
+      </p:sp>
+      <p:sp>
+        <p:nvSpPr>
+          <p:cNvPr id="9" name="Oval 8">
+            <a:extLst>
+              <a:ext uri="{FF2B5EF4-FFF2-40B4-BE49-F238E27FC236}">
+                <a16:creationId xmlns:a16="http://schemas.microsoft.com/office/drawing/2014/main" id="{893A8A11-9553-4412-9E85-A0752595CA6E}"/>
+              </a:ext>
+            </a:extLst>
+          </p:cNvPr>
+          <p:cNvSpPr/>
+          <p:nvPr/>
+        </p:nvSpPr>
+        <p:spPr>
+          <a:xfrm>
+            <a:off x="3826276" y="2483528"/>
+            <a:ext cx="1233996" cy="1260629"/>
+          </a:xfrm>
+          <a:prstGeom prst="ellipse">
+            <a:avLst/>
+          </a:prstGeom>
+          <a:noFill/>
+        </p:spPr>
+        <p:style>
+          <a:lnRef idx="2">
+            <a:schemeClr val="accent1">
+              <a:shade val="50000"/>
+            </a:schemeClr>
+          </a:lnRef>
+          <a:fillRef idx="1">
+            <a:schemeClr val="accent1"/>
+          </a:fillRef>
+          <a:effectRef idx="0">
+            <a:schemeClr val="accent1"/>
+          </a:effectRef>
+          <a:fontRef idx="minor">
+            <a:schemeClr val="lt1"/>
+          </a:fontRef>
+        </p:style>
+        <p:txBody>
+          <a:bodyPr rtlCol="0" anchor="ctr"/>
+          <a:lstStyle/>
+          <a:p>
+            <a:pPr algn="ctr"/>
+            <a:endParaRPr lang="en-US"/>
+          </a:p>
+        </p:txBody>
+      </p:sp>
+      <p:cxnSp>
+        <p:nvCxnSpPr>
+          <p:cNvPr id="12" name="Straight Arrow Connector 11">
+            <a:extLst>
+              <a:ext uri="{FF2B5EF4-FFF2-40B4-BE49-F238E27FC236}">
+                <a16:creationId xmlns:a16="http://schemas.microsoft.com/office/drawing/2014/main" id="{2DC71B34-A1AB-41AD-99E3-FAF9B164AFE9}"/>
+              </a:ext>
+            </a:extLst>
+          </p:cNvPr>
+          <p:cNvCxnSpPr>
+            <a:stCxn id="4" idx="6"/>
+            <a:endCxn id="9" idx="2"/>
+          </p:cNvCxnSpPr>
+          <p:nvPr/>
+        </p:nvCxnSpPr>
+        <p:spPr>
+          <a:xfrm>
+            <a:off x="1926454" y="2574525"/>
+            <a:ext cx="1899822" cy="539318"/>
+          </a:xfrm>
+          <a:prstGeom prst="straightConnector1">
+            <a:avLst/>
+          </a:prstGeom>
+          <a:ln>
+            <a:tailEnd type="triangle"/>
+          </a:ln>
+        </p:spPr>
+        <p:style>
+          <a:lnRef idx="1">
+            <a:schemeClr val="accent1"/>
+          </a:lnRef>
+          <a:fillRef idx="0">
+            <a:schemeClr val="accent1"/>
+          </a:fillRef>
+          <a:effectRef idx="0">
+            <a:schemeClr val="accent1"/>
+          </a:effectRef>
+          <a:fontRef idx="minor">
+            <a:schemeClr val="tx1"/>
+          </a:fontRef>
+        </p:style>
+      </p:cxnSp>
+      <p:cxnSp>
+        <p:nvCxnSpPr>
+          <p:cNvPr id="14" name="Straight Arrow Connector 13">
+            <a:extLst>
+              <a:ext uri="{FF2B5EF4-FFF2-40B4-BE49-F238E27FC236}">
+                <a16:creationId xmlns:a16="http://schemas.microsoft.com/office/drawing/2014/main" id="{866AC40A-A8FC-478E-8403-39458251F54B}"/>
+              </a:ext>
+            </a:extLst>
+          </p:cNvPr>
+          <p:cNvCxnSpPr>
+            <a:stCxn id="4" idx="7"/>
+            <a:endCxn id="8" idx="2"/>
+          </p:cNvCxnSpPr>
+          <p:nvPr/>
+        </p:nvCxnSpPr>
+        <p:spPr>
+          <a:xfrm flipV="1">
+            <a:off x="1745739" y="953442"/>
+            <a:ext cx="2080537" cy="1175383"/>
+          </a:xfrm>
+          <a:prstGeom prst="straightConnector1">
+            <a:avLst/>
+          </a:prstGeom>
+          <a:ln>
+            <a:tailEnd type="triangle"/>
+          </a:ln>
+        </p:spPr>
+        <p:style>
+          <a:lnRef idx="1">
+            <a:schemeClr val="accent1"/>
+          </a:lnRef>
+          <a:fillRef idx="0">
+            <a:schemeClr val="accent1"/>
+          </a:fillRef>
+          <a:effectRef idx="0">
+            <a:schemeClr val="accent1"/>
+          </a:effectRef>
+          <a:fontRef idx="minor">
+            <a:schemeClr val="tx1"/>
+          </a:fontRef>
+        </p:style>
+      </p:cxnSp>
+      <p:sp>
+        <p:nvSpPr>
+          <p:cNvPr id="15" name="TextBox 14">
+            <a:extLst>
+              <a:ext uri="{FF2B5EF4-FFF2-40B4-BE49-F238E27FC236}">
+                <a16:creationId xmlns:a16="http://schemas.microsoft.com/office/drawing/2014/main" id="{CE26BEA7-E224-42E8-B306-55F29C6F1E76}"/>
+              </a:ext>
+            </a:extLst>
+          </p:cNvPr>
+          <p:cNvSpPr txBox="1"/>
+          <p:nvPr/>
+        </p:nvSpPr>
+        <p:spPr>
+          <a:xfrm rot="19817946">
+            <a:off x="1989875" y="991751"/>
+            <a:ext cx="1485733" cy="523220"/>
+          </a:xfrm>
+          <a:prstGeom prst="rect">
+            <a:avLst/>
+          </a:prstGeom>
+          <a:noFill/>
+        </p:spPr>
+        <p:txBody>
+          <a:bodyPr wrap="square" rtlCol="0">
+            <a:spAutoFit/>
+          </a:bodyPr>
+          <a:lstStyle/>
+          <a:p>
+            <a:r>
+              <a:rPr lang="en-US" sz="1400" dirty="0"/>
+              <a:t>Play, win round 1</a:t>
+            </a:r>
+          </a:p>
+          <a:p>
+            <a:r>
+              <a:rPr lang="en-US" sz="1400" dirty="0"/>
+              <a:t>P = 0.5</a:t>
+            </a:r>
+          </a:p>
+        </p:txBody>
+      </p:sp>
+      <p:sp>
+        <p:nvSpPr>
+          <p:cNvPr id="16" name="TextBox 15">
+            <a:extLst>
+              <a:ext uri="{FF2B5EF4-FFF2-40B4-BE49-F238E27FC236}">
+                <a16:creationId xmlns:a16="http://schemas.microsoft.com/office/drawing/2014/main" id="{FABB7786-5958-4676-A5BC-EBDAE10C5372}"/>
+              </a:ext>
+            </a:extLst>
+          </p:cNvPr>
+          <p:cNvSpPr txBox="1"/>
+          <p:nvPr/>
+        </p:nvSpPr>
+        <p:spPr>
+          <a:xfrm rot="761580">
+            <a:off x="2301215" y="2267417"/>
+            <a:ext cx="1485733" cy="523220"/>
+          </a:xfrm>
+          <a:prstGeom prst="rect">
+            <a:avLst/>
+          </a:prstGeom>
+          <a:noFill/>
+        </p:spPr>
+        <p:txBody>
+          <a:bodyPr wrap="square" rtlCol="0">
+            <a:spAutoFit/>
+          </a:bodyPr>
+          <a:lstStyle/>
+          <a:p>
+            <a:r>
+              <a:rPr lang="en-US" sz="1400" dirty="0"/>
+              <a:t>Play, lose round 1</a:t>
+            </a:r>
+          </a:p>
+          <a:p>
+            <a:r>
+              <a:rPr lang="en-US" sz="1400" dirty="0"/>
+              <a:t>P = 0.5</a:t>
+            </a:r>
+          </a:p>
+        </p:txBody>
+      </p:sp>
+      <p:sp>
+        <p:nvSpPr>
+          <p:cNvPr id="17" name="TextBox 16">
+            <a:extLst>
+              <a:ext uri="{FF2B5EF4-FFF2-40B4-BE49-F238E27FC236}">
+                <a16:creationId xmlns:a16="http://schemas.microsoft.com/office/drawing/2014/main" id="{88440AD4-70FA-4030-9544-FB3C2E10CBB0}"/>
+              </a:ext>
+            </a:extLst>
+          </p:cNvPr>
+          <p:cNvSpPr txBox="1"/>
+          <p:nvPr/>
+        </p:nvSpPr>
+        <p:spPr>
+          <a:xfrm rot="2813981">
+            <a:off x="2331543" y="3838310"/>
+            <a:ext cx="1485733" cy="523220"/>
+          </a:xfrm>
+          <a:prstGeom prst="rect">
+            <a:avLst/>
+          </a:prstGeom>
+          <a:noFill/>
+        </p:spPr>
+        <p:txBody>
+          <a:bodyPr wrap="square" rtlCol="0">
+            <a:spAutoFit/>
+          </a:bodyPr>
+          <a:lstStyle/>
+          <a:p>
+            <a:r>
+              <a:rPr lang="en-US" sz="1400" dirty="0"/>
+              <a:t>Don’t, play</a:t>
+            </a:r>
+          </a:p>
+          <a:p>
+            <a:r>
+              <a:rPr lang="en-US" sz="1400" dirty="0"/>
+              <a:t>P = 1</a:t>
+            </a:r>
+          </a:p>
+        </p:txBody>
+      </p:sp>
+      <p:sp>
+        <p:nvSpPr>
+          <p:cNvPr id="18" name="TextBox 17">
+            <a:extLst>
+              <a:ext uri="{FF2B5EF4-FFF2-40B4-BE49-F238E27FC236}">
+                <a16:creationId xmlns:a16="http://schemas.microsoft.com/office/drawing/2014/main" id="{549037BF-9F43-4E45-91A9-DAAFA8FFDB22}"/>
+              </a:ext>
+            </a:extLst>
+          </p:cNvPr>
+          <p:cNvSpPr txBox="1"/>
+          <p:nvPr/>
+        </p:nvSpPr>
+        <p:spPr>
+          <a:xfrm>
+            <a:off x="930234" y="2097471"/>
+            <a:ext cx="969587" cy="954107"/>
+          </a:xfrm>
+          <a:prstGeom prst="rect">
+            <a:avLst/>
+          </a:prstGeom>
+          <a:noFill/>
+        </p:spPr>
+        <p:txBody>
+          <a:bodyPr wrap="square" rtlCol="0">
+            <a:spAutoFit/>
+          </a:bodyPr>
+          <a:lstStyle/>
+          <a:p>
+            <a:r>
+              <a:rPr lang="en-US" sz="1400" b="1" dirty="0"/>
+              <a:t>State 0</a:t>
+            </a:r>
+          </a:p>
+          <a:p>
+            <a:r>
+              <a:rPr lang="en-US" sz="1400" dirty="0"/>
+              <a:t>Choice: play/no play</a:t>
+            </a:r>
+          </a:p>
+        </p:txBody>
+      </p:sp>
+      <p:sp>
+        <p:nvSpPr>
+          <p:cNvPr id="19" name="TextBox 18">
+            <a:extLst>
+              <a:ext uri="{FF2B5EF4-FFF2-40B4-BE49-F238E27FC236}">
+                <a16:creationId xmlns:a16="http://schemas.microsoft.com/office/drawing/2014/main" id="{9DD707F2-F9F0-455F-A03B-A146E89556A5}"/>
+              </a:ext>
+            </a:extLst>
+          </p:cNvPr>
+          <p:cNvSpPr txBox="1"/>
+          <p:nvPr/>
+        </p:nvSpPr>
+        <p:spPr>
+          <a:xfrm>
+            <a:off x="3910931" y="4865980"/>
+            <a:ext cx="969587" cy="738664"/>
+          </a:xfrm>
+          <a:prstGeom prst="rect">
+            <a:avLst/>
+          </a:prstGeom>
+          <a:noFill/>
+        </p:spPr>
+        <p:txBody>
+          <a:bodyPr wrap="square" rtlCol="0">
+            <a:spAutoFit/>
+          </a:bodyPr>
+          <a:lstStyle/>
+          <a:p>
+            <a:r>
+              <a:rPr lang="en-US" sz="1400" b="1" dirty="0"/>
+              <a:t>State 3</a:t>
+            </a:r>
+          </a:p>
+          <a:p>
+            <a:r>
+              <a:rPr lang="en-US" sz="1400" dirty="0"/>
+              <a:t>No play</a:t>
+            </a:r>
+          </a:p>
+          <a:p>
+            <a:r>
+              <a:rPr lang="en-US" sz="1400" dirty="0"/>
+              <a:t>Reward=0</a:t>
+            </a:r>
+          </a:p>
+        </p:txBody>
+      </p:sp>
+      <p:sp>
+        <p:nvSpPr>
+          <p:cNvPr id="20" name="TextBox 19">
+            <a:extLst>
+              <a:ext uri="{FF2B5EF4-FFF2-40B4-BE49-F238E27FC236}">
+                <a16:creationId xmlns:a16="http://schemas.microsoft.com/office/drawing/2014/main" id="{A590B9D0-D127-434D-880F-3E909FFF9D15}"/>
+              </a:ext>
+            </a:extLst>
+          </p:cNvPr>
+          <p:cNvSpPr txBox="1"/>
+          <p:nvPr/>
+        </p:nvSpPr>
+        <p:spPr>
+          <a:xfrm>
+            <a:off x="4090685" y="476388"/>
+            <a:ext cx="863055" cy="1107996"/>
+          </a:xfrm>
+          <a:prstGeom prst="rect">
+            <a:avLst/>
+          </a:prstGeom>
+          <a:noFill/>
+        </p:spPr>
+        <p:txBody>
+          <a:bodyPr wrap="square" rtlCol="0">
+            <a:spAutoFit/>
+          </a:bodyPr>
+          <a:lstStyle/>
+          <a:p>
+            <a:r>
+              <a:rPr lang="en-US" sz="1400" b="1" dirty="0"/>
+              <a:t>State 1</a:t>
+            </a:r>
+          </a:p>
+          <a:p>
+            <a:r>
+              <a:rPr lang="en-US" sz="1300" dirty="0"/>
+              <a:t>Won </a:t>
+            </a:r>
+          </a:p>
+          <a:p>
+            <a:r>
+              <a:rPr lang="en-US" sz="1300" dirty="0"/>
+              <a:t>Choice: play/no play</a:t>
+            </a:r>
+          </a:p>
+        </p:txBody>
+      </p:sp>
+      <p:sp>
+        <p:nvSpPr>
+          <p:cNvPr id="21" name="TextBox 20">
+            <a:extLst>
+              <a:ext uri="{FF2B5EF4-FFF2-40B4-BE49-F238E27FC236}">
+                <a16:creationId xmlns:a16="http://schemas.microsoft.com/office/drawing/2014/main" id="{A68DE8B0-F4DA-4A53-A072-98FC66962EED}"/>
+              </a:ext>
+            </a:extLst>
+          </p:cNvPr>
+          <p:cNvSpPr txBox="1"/>
+          <p:nvPr/>
+        </p:nvSpPr>
+        <p:spPr>
+          <a:xfrm>
+            <a:off x="4037416" y="2636788"/>
+            <a:ext cx="1076119" cy="738664"/>
+          </a:xfrm>
+          <a:prstGeom prst="rect">
+            <a:avLst/>
+          </a:prstGeom>
+          <a:noFill/>
+        </p:spPr>
+        <p:txBody>
+          <a:bodyPr wrap="square" rtlCol="0">
+            <a:spAutoFit/>
+          </a:bodyPr>
+          <a:lstStyle/>
+          <a:p>
+            <a:r>
+              <a:rPr lang="en-US" sz="1400" b="1" dirty="0"/>
+              <a:t>State 2</a:t>
+            </a:r>
+          </a:p>
+          <a:p>
+            <a:r>
+              <a:rPr lang="en-US" sz="1400" dirty="0"/>
+              <a:t>Lost</a:t>
+            </a:r>
+          </a:p>
+          <a:p>
+            <a:r>
+              <a:rPr lang="en-US" sz="1400" dirty="0"/>
+              <a:t>Reward=-10</a:t>
+            </a:r>
+          </a:p>
+        </p:txBody>
+      </p:sp>
+      <p:sp>
+        <p:nvSpPr>
+          <p:cNvPr id="22" name="Oval 21">
+            <a:extLst>
+              <a:ext uri="{FF2B5EF4-FFF2-40B4-BE49-F238E27FC236}">
+                <a16:creationId xmlns:a16="http://schemas.microsoft.com/office/drawing/2014/main" id="{ECAA1557-6C6F-4932-A84D-5678AFA6FE2C}"/>
+              </a:ext>
+            </a:extLst>
+          </p:cNvPr>
+          <p:cNvSpPr/>
+          <p:nvPr/>
+        </p:nvSpPr>
+        <p:spPr>
+          <a:xfrm>
+            <a:off x="7423212" y="328137"/>
+            <a:ext cx="1233996" cy="1260629"/>
+          </a:xfrm>
+          <a:prstGeom prst="ellipse">
+            <a:avLst/>
+          </a:prstGeom>
+          <a:noFill/>
+        </p:spPr>
+        <p:style>
+          <a:lnRef idx="2">
+            <a:schemeClr val="accent1">
+              <a:shade val="50000"/>
+            </a:schemeClr>
+          </a:lnRef>
+          <a:fillRef idx="1">
+            <a:schemeClr val="accent1"/>
+          </a:fillRef>
+          <a:effectRef idx="0">
+            <a:schemeClr val="accent1"/>
+          </a:effectRef>
+          <a:fontRef idx="minor">
+            <a:schemeClr val="lt1"/>
+          </a:fontRef>
+        </p:style>
+        <p:txBody>
+          <a:bodyPr rtlCol="0" anchor="ctr"/>
+          <a:lstStyle/>
+          <a:p>
+            <a:pPr algn="ctr"/>
+            <a:endParaRPr lang="en-US"/>
+          </a:p>
+        </p:txBody>
+      </p:sp>
+      <p:sp>
+        <p:nvSpPr>
+          <p:cNvPr id="23" name="Oval 22">
+            <a:extLst>
+              <a:ext uri="{FF2B5EF4-FFF2-40B4-BE49-F238E27FC236}">
+                <a16:creationId xmlns:a16="http://schemas.microsoft.com/office/drawing/2014/main" id="{94C96703-6572-440A-872A-ECB1868CD0E2}"/>
+              </a:ext>
+            </a:extLst>
+          </p:cNvPr>
+          <p:cNvSpPr/>
+          <p:nvPr/>
+        </p:nvSpPr>
+        <p:spPr>
+          <a:xfrm>
+            <a:off x="7477956" y="1745491"/>
+            <a:ext cx="1233996" cy="1260629"/>
+          </a:xfrm>
+          <a:prstGeom prst="ellipse">
+            <a:avLst/>
+          </a:prstGeom>
+          <a:noFill/>
+        </p:spPr>
+        <p:style>
+          <a:lnRef idx="2">
+            <a:schemeClr val="accent1">
+              <a:shade val="50000"/>
+            </a:schemeClr>
+          </a:lnRef>
+          <a:fillRef idx="1">
+            <a:schemeClr val="accent1"/>
+          </a:fillRef>
+          <a:effectRef idx="0">
+            <a:schemeClr val="accent1"/>
+          </a:effectRef>
+          <a:fontRef idx="minor">
+            <a:schemeClr val="lt1"/>
+          </a:fontRef>
+        </p:style>
+        <p:txBody>
+          <a:bodyPr rtlCol="0" anchor="ctr"/>
+          <a:lstStyle/>
+          <a:p>
+            <a:pPr algn="ctr"/>
+            <a:endParaRPr lang="en-US"/>
+          </a:p>
+        </p:txBody>
+      </p:sp>
+      <p:cxnSp>
+        <p:nvCxnSpPr>
+          <p:cNvPr id="25" name="Straight Arrow Connector 24">
+            <a:extLst>
+              <a:ext uri="{FF2B5EF4-FFF2-40B4-BE49-F238E27FC236}">
+                <a16:creationId xmlns:a16="http://schemas.microsoft.com/office/drawing/2014/main" id="{97544E21-7CF1-4953-8E43-3F15C64C0EE9}"/>
+              </a:ext>
+            </a:extLst>
+          </p:cNvPr>
+          <p:cNvCxnSpPr>
+            <a:cxnSpLocks/>
+            <a:stCxn id="8" idx="6"/>
+            <a:endCxn id="22" idx="2"/>
+          </p:cNvCxnSpPr>
+          <p:nvPr/>
+        </p:nvCxnSpPr>
+        <p:spPr>
+          <a:xfrm>
+            <a:off x="5060272" y="953442"/>
+            <a:ext cx="2362940" cy="5010"/>
+          </a:xfrm>
+          <a:prstGeom prst="straightConnector1">
+            <a:avLst/>
+          </a:prstGeom>
+          <a:ln>
+            <a:tailEnd type="triangle"/>
+          </a:ln>
+        </p:spPr>
+        <p:style>
+          <a:lnRef idx="1">
+            <a:schemeClr val="accent1"/>
+          </a:lnRef>
+          <a:fillRef idx="0">
+            <a:schemeClr val="accent1"/>
+          </a:fillRef>
+          <a:effectRef idx="0">
+            <a:schemeClr val="accent1"/>
+          </a:effectRef>
+          <a:fontRef idx="minor">
+            <a:schemeClr val="tx1"/>
+          </a:fontRef>
+        </p:style>
+      </p:cxnSp>
+      <p:cxnSp>
+        <p:nvCxnSpPr>
+          <p:cNvPr id="27" name="Straight Arrow Connector 26">
+            <a:extLst>
+              <a:ext uri="{FF2B5EF4-FFF2-40B4-BE49-F238E27FC236}">
+                <a16:creationId xmlns:a16="http://schemas.microsoft.com/office/drawing/2014/main" id="{6FD95485-BD04-419E-93E2-7FBCE0BDA759}"/>
+              </a:ext>
+            </a:extLst>
+          </p:cNvPr>
+          <p:cNvCxnSpPr>
+            <a:cxnSpLocks/>
+            <a:stCxn id="8" idx="6"/>
+            <a:endCxn id="23" idx="2"/>
+          </p:cNvCxnSpPr>
+          <p:nvPr/>
+        </p:nvCxnSpPr>
+        <p:spPr>
+          <a:xfrm>
+            <a:off x="5060272" y="953442"/>
+            <a:ext cx="2417684" cy="1422364"/>
+          </a:xfrm>
+          <a:prstGeom prst="straightConnector1">
+            <a:avLst/>
+          </a:prstGeom>
+          <a:ln>
+            <a:tailEnd type="triangle"/>
+          </a:ln>
+        </p:spPr>
+        <p:style>
+          <a:lnRef idx="1">
+            <a:schemeClr val="accent1"/>
+          </a:lnRef>
+          <a:fillRef idx="0">
+            <a:schemeClr val="accent1"/>
+          </a:fillRef>
+          <a:effectRef idx="0">
+            <a:schemeClr val="accent1"/>
+          </a:effectRef>
+          <a:fontRef idx="minor">
+            <a:schemeClr val="tx1"/>
+          </a:fontRef>
+        </p:style>
+      </p:cxnSp>
+      <p:sp>
+        <p:nvSpPr>
+          <p:cNvPr id="28" name="TextBox 27">
+            <a:extLst>
+              <a:ext uri="{FF2B5EF4-FFF2-40B4-BE49-F238E27FC236}">
+                <a16:creationId xmlns:a16="http://schemas.microsoft.com/office/drawing/2014/main" id="{26F54C4A-F083-4DF5-B46D-50660391D0B5}"/>
+              </a:ext>
+            </a:extLst>
+          </p:cNvPr>
+          <p:cNvSpPr txBox="1"/>
+          <p:nvPr/>
+        </p:nvSpPr>
+        <p:spPr>
+          <a:xfrm>
+            <a:off x="7531219" y="584109"/>
+            <a:ext cx="1323216" cy="738664"/>
+          </a:xfrm>
+          <a:prstGeom prst="rect">
+            <a:avLst/>
+          </a:prstGeom>
+          <a:noFill/>
+        </p:spPr>
+        <p:txBody>
+          <a:bodyPr wrap="square" rtlCol="0">
+            <a:spAutoFit/>
+          </a:bodyPr>
+          <a:lstStyle/>
+          <a:p>
+            <a:r>
+              <a:rPr lang="en-US" sz="1400" b="1" dirty="0"/>
+              <a:t>State 4</a:t>
+            </a:r>
+          </a:p>
+          <a:p>
+            <a:r>
+              <a:rPr lang="en-US" sz="1400" dirty="0"/>
+              <a:t>Won, Won</a:t>
+            </a:r>
+          </a:p>
+          <a:p>
+            <a:r>
+              <a:rPr lang="en-US" sz="1400" dirty="0"/>
+              <a:t>Reward=100</a:t>
+            </a:r>
+          </a:p>
+        </p:txBody>
+      </p:sp>
+      <p:sp>
+        <p:nvSpPr>
+          <p:cNvPr id="30" name="TextBox 29">
+            <a:extLst>
+              <a:ext uri="{FF2B5EF4-FFF2-40B4-BE49-F238E27FC236}">
+                <a16:creationId xmlns:a16="http://schemas.microsoft.com/office/drawing/2014/main" id="{BE447D27-3A0F-445B-A2D7-18F38D48F6F1}"/>
+              </a:ext>
+            </a:extLst>
+          </p:cNvPr>
+          <p:cNvSpPr txBox="1"/>
+          <p:nvPr/>
+        </p:nvSpPr>
+        <p:spPr>
+          <a:xfrm>
+            <a:off x="7593999" y="1959746"/>
+            <a:ext cx="1233996" cy="738664"/>
+          </a:xfrm>
+          <a:prstGeom prst="rect">
+            <a:avLst/>
+          </a:prstGeom>
+          <a:noFill/>
+        </p:spPr>
+        <p:txBody>
+          <a:bodyPr wrap="square" rtlCol="0">
+            <a:spAutoFit/>
+          </a:bodyPr>
+          <a:lstStyle/>
+          <a:p>
+            <a:r>
+              <a:rPr lang="en-US" sz="1400" b="1" dirty="0"/>
+              <a:t>State 5</a:t>
+            </a:r>
+          </a:p>
+          <a:p>
+            <a:r>
+              <a:rPr lang="en-US" sz="1400" dirty="0"/>
+              <a:t>Won, Lost</a:t>
+            </a:r>
+          </a:p>
+          <a:p>
+            <a:r>
+              <a:rPr lang="en-US" sz="1400" dirty="0"/>
+              <a:t>Reward=-50</a:t>
+            </a:r>
+          </a:p>
+        </p:txBody>
+      </p:sp>
+      <p:sp>
+        <p:nvSpPr>
+          <p:cNvPr id="31" name="TextBox 30">
+            <a:extLst>
+              <a:ext uri="{FF2B5EF4-FFF2-40B4-BE49-F238E27FC236}">
+                <a16:creationId xmlns:a16="http://schemas.microsoft.com/office/drawing/2014/main" id="{48DA6532-D31A-4770-A64A-7AF60037CFB1}"/>
+              </a:ext>
+            </a:extLst>
+          </p:cNvPr>
+          <p:cNvSpPr txBox="1"/>
+          <p:nvPr/>
+        </p:nvSpPr>
+        <p:spPr>
+          <a:xfrm>
+            <a:off x="5879458" y="446619"/>
+            <a:ext cx="1485733" cy="523220"/>
+          </a:xfrm>
+          <a:prstGeom prst="rect">
+            <a:avLst/>
+          </a:prstGeom>
+          <a:noFill/>
+        </p:spPr>
+        <p:txBody>
+          <a:bodyPr wrap="square" rtlCol="0">
+            <a:spAutoFit/>
+          </a:bodyPr>
+          <a:lstStyle/>
+          <a:p>
+            <a:r>
+              <a:rPr lang="en-US" sz="1400" dirty="0"/>
+              <a:t>Play, win round 2</a:t>
+            </a:r>
+          </a:p>
+          <a:p>
+            <a:r>
+              <a:rPr lang="en-US" sz="1400" dirty="0"/>
+              <a:t>P = 0.5</a:t>
+            </a:r>
+          </a:p>
+        </p:txBody>
+      </p:sp>
+      <p:sp>
+        <p:nvSpPr>
+          <p:cNvPr id="32" name="TextBox 31">
+            <a:extLst>
+              <a:ext uri="{FF2B5EF4-FFF2-40B4-BE49-F238E27FC236}">
+                <a16:creationId xmlns:a16="http://schemas.microsoft.com/office/drawing/2014/main" id="{91E3E1AF-0FDC-44FD-A8D1-72348E45C4C1}"/>
+              </a:ext>
+            </a:extLst>
+          </p:cNvPr>
+          <p:cNvSpPr txBox="1"/>
+          <p:nvPr/>
+        </p:nvSpPr>
+        <p:spPr>
+          <a:xfrm rot="3135057">
+            <a:off x="5526885" y="2810329"/>
+            <a:ext cx="1612166" cy="523220"/>
+          </a:xfrm>
+          <a:prstGeom prst="rect">
+            <a:avLst/>
+          </a:prstGeom>
+          <a:noFill/>
+        </p:spPr>
+        <p:txBody>
+          <a:bodyPr wrap="square" rtlCol="0">
+            <a:spAutoFit/>
+          </a:bodyPr>
+          <a:lstStyle/>
+          <a:p>
+            <a:r>
+              <a:rPr lang="en-US" sz="1400" dirty="0"/>
+              <a:t>Don’t play round 2</a:t>
+            </a:r>
+          </a:p>
+          <a:p>
+            <a:r>
+              <a:rPr lang="en-US" sz="1400" dirty="0"/>
+              <a:t>P = 1</a:t>
+            </a:r>
+          </a:p>
+        </p:txBody>
+      </p:sp>
+      <p:sp>
+        <p:nvSpPr>
+          <p:cNvPr id="34" name="TextBox 33">
+            <a:extLst>
+              <a:ext uri="{FF2B5EF4-FFF2-40B4-BE49-F238E27FC236}">
+                <a16:creationId xmlns:a16="http://schemas.microsoft.com/office/drawing/2014/main" id="{6E9ADF2A-68A9-46B0-B6CB-F9E9DFB8F46C}"/>
+              </a:ext>
+            </a:extLst>
+          </p:cNvPr>
+          <p:cNvSpPr txBox="1"/>
+          <p:nvPr/>
+        </p:nvSpPr>
+        <p:spPr>
+          <a:xfrm>
+            <a:off x="338414" y="88363"/>
+            <a:ext cx="2796466" cy="861774"/>
+          </a:xfrm>
+          <a:prstGeom prst="rect">
+            <a:avLst/>
+          </a:prstGeom>
+          <a:noFill/>
+        </p:spPr>
+        <p:txBody>
+          <a:bodyPr wrap="square" rtlCol="0">
+            <a:spAutoFit/>
+          </a:bodyPr>
+          <a:lstStyle/>
+          <a:p>
+            <a:r>
+              <a:rPr lang="en-US" b="1" u="sng" dirty="0"/>
+              <a:t>Goal</a:t>
+            </a:r>
+          </a:p>
+          <a:p>
+            <a:r>
+              <a:rPr lang="en-US" sz="1400" dirty="0"/>
+              <a:t>Determine action from state 0 that maximizes expected reward</a:t>
+            </a:r>
+            <a:r>
+              <a:rPr lang="en-US" dirty="0"/>
+              <a:t>.</a:t>
+            </a:r>
+          </a:p>
+        </p:txBody>
+      </p:sp>
+      <p:cxnSp>
+        <p:nvCxnSpPr>
+          <p:cNvPr id="24" name="Straight Arrow Connector 23">
+            <a:extLst>
+              <a:ext uri="{FF2B5EF4-FFF2-40B4-BE49-F238E27FC236}">
+                <a16:creationId xmlns:a16="http://schemas.microsoft.com/office/drawing/2014/main" id="{3EDCAFF6-63D1-42B4-A966-9370771BAAF7}"/>
+              </a:ext>
+            </a:extLst>
+          </p:cNvPr>
+          <p:cNvCxnSpPr>
+            <a:cxnSpLocks/>
+            <a:stCxn id="8" idx="6"/>
+            <a:endCxn id="36" idx="2"/>
+          </p:cNvCxnSpPr>
+          <p:nvPr/>
+        </p:nvCxnSpPr>
+        <p:spPr>
+          <a:xfrm>
+            <a:off x="5060272" y="953442"/>
+            <a:ext cx="2417684" cy="3012256"/>
+          </a:xfrm>
+          <a:prstGeom prst="straightConnector1">
+            <a:avLst/>
+          </a:prstGeom>
+          <a:ln>
+            <a:tailEnd type="triangle"/>
+          </a:ln>
+        </p:spPr>
+        <p:style>
+          <a:lnRef idx="1">
+            <a:schemeClr val="accent1"/>
+          </a:lnRef>
+          <a:fillRef idx="0">
+            <a:schemeClr val="accent1"/>
+          </a:fillRef>
+          <a:effectRef idx="0">
+            <a:schemeClr val="accent1"/>
+          </a:effectRef>
+          <a:fontRef idx="minor">
+            <a:schemeClr val="tx1"/>
+          </a:fontRef>
+        </p:style>
+      </p:cxnSp>
+      <p:sp>
+        <p:nvSpPr>
+          <p:cNvPr id="36" name="Oval 35">
+            <a:extLst>
+              <a:ext uri="{FF2B5EF4-FFF2-40B4-BE49-F238E27FC236}">
+                <a16:creationId xmlns:a16="http://schemas.microsoft.com/office/drawing/2014/main" id="{2603DFB7-06B0-41AB-AE68-59023DD2FA3D}"/>
+              </a:ext>
+            </a:extLst>
+          </p:cNvPr>
+          <p:cNvSpPr/>
+          <p:nvPr/>
+        </p:nvSpPr>
+        <p:spPr>
+          <a:xfrm>
+            <a:off x="7477956" y="3335383"/>
+            <a:ext cx="1233996" cy="1260629"/>
+          </a:xfrm>
+          <a:prstGeom prst="ellipse">
+            <a:avLst/>
+          </a:prstGeom>
+          <a:noFill/>
+        </p:spPr>
+        <p:style>
+          <a:lnRef idx="2">
+            <a:schemeClr val="accent1">
+              <a:shade val="50000"/>
+            </a:schemeClr>
+          </a:lnRef>
+          <a:fillRef idx="1">
+            <a:schemeClr val="accent1"/>
+          </a:fillRef>
+          <a:effectRef idx="0">
+            <a:schemeClr val="accent1"/>
+          </a:effectRef>
+          <a:fontRef idx="minor">
+            <a:schemeClr val="lt1"/>
+          </a:fontRef>
+        </p:style>
+        <p:txBody>
+          <a:bodyPr rtlCol="0" anchor="ctr"/>
+          <a:lstStyle/>
+          <a:p>
+            <a:pPr algn="ctr"/>
+            <a:endParaRPr lang="en-US"/>
+          </a:p>
+        </p:txBody>
+      </p:sp>
+      <p:sp>
+        <p:nvSpPr>
+          <p:cNvPr id="37" name="TextBox 36">
+            <a:extLst>
+              <a:ext uri="{FF2B5EF4-FFF2-40B4-BE49-F238E27FC236}">
+                <a16:creationId xmlns:a16="http://schemas.microsoft.com/office/drawing/2014/main" id="{6D6396D6-768E-41CC-A189-AF2E1B298E1C}"/>
+              </a:ext>
+            </a:extLst>
+          </p:cNvPr>
+          <p:cNvSpPr txBox="1"/>
+          <p:nvPr/>
+        </p:nvSpPr>
+        <p:spPr>
+          <a:xfrm rot="1894447">
+            <a:off x="6023236" y="1423986"/>
+            <a:ext cx="1485733" cy="523220"/>
+          </a:xfrm>
+          <a:prstGeom prst="rect">
+            <a:avLst/>
+          </a:prstGeom>
+          <a:noFill/>
+        </p:spPr>
+        <p:txBody>
+          <a:bodyPr wrap="square" rtlCol="0">
+            <a:spAutoFit/>
+          </a:bodyPr>
+          <a:lstStyle/>
+          <a:p>
+            <a:r>
+              <a:rPr lang="en-US" sz="1400" dirty="0"/>
+              <a:t>Play, lose round 2</a:t>
+            </a:r>
+          </a:p>
+          <a:p>
+            <a:r>
+              <a:rPr lang="en-US" sz="1400" dirty="0"/>
+              <a:t>P = 0.5</a:t>
+            </a:r>
+          </a:p>
+        </p:txBody>
+      </p:sp>
+      <p:sp>
+        <p:nvSpPr>
+          <p:cNvPr id="38" name="TextBox 37">
+            <a:extLst>
+              <a:ext uri="{FF2B5EF4-FFF2-40B4-BE49-F238E27FC236}">
+                <a16:creationId xmlns:a16="http://schemas.microsoft.com/office/drawing/2014/main" id="{73D49CFE-77DB-4FFD-B213-289F66F98F8A}"/>
+              </a:ext>
+            </a:extLst>
+          </p:cNvPr>
+          <p:cNvSpPr txBox="1"/>
+          <p:nvPr/>
+        </p:nvSpPr>
+        <p:spPr>
+          <a:xfrm>
+            <a:off x="7593999" y="3596365"/>
+            <a:ext cx="1233996" cy="738664"/>
+          </a:xfrm>
+          <a:prstGeom prst="rect">
+            <a:avLst/>
+          </a:prstGeom>
+          <a:noFill/>
+        </p:spPr>
+        <p:txBody>
+          <a:bodyPr wrap="square" rtlCol="0">
+            <a:spAutoFit/>
+          </a:bodyPr>
+          <a:lstStyle/>
+          <a:p>
+            <a:r>
+              <a:rPr lang="en-US" sz="1400" b="1" dirty="0"/>
+              <a:t>State 6</a:t>
+            </a:r>
+          </a:p>
+          <a:p>
+            <a:r>
+              <a:rPr lang="en-US" sz="1400" dirty="0"/>
+              <a:t>Won, No play</a:t>
+            </a:r>
+          </a:p>
+          <a:p>
+            <a:r>
+              <a:rPr lang="en-US" sz="1400" dirty="0"/>
+              <a:t>Reward=10</a:t>
+            </a:r>
+          </a:p>
+        </p:txBody>
+      </p:sp>
+    </p:spTree>
+    <p:extLst>
+      <p:ext uri="{BB962C8B-B14F-4D97-AF65-F5344CB8AC3E}">
+        <p14:creationId xmlns:p14="http://schemas.microsoft.com/office/powerpoint/2010/main" val="3946811461"/>
+      </p:ext>
+    </p:extLst>
+  </p:cSld>
+  <p:clrMapOvr>
+    <a:masterClrMapping/>
+  </p:clrMapOvr>
+</p:sld>
+</file>
+
 <file path=ppt/theme/theme1.xml><?xml version="1.0" encoding="utf-8"?>
 <a:theme xmlns:a="http://schemas.openxmlformats.org/drawingml/2006/main" name="Office Theme">
   <a:themeElements>

</xml_diff>